<commit_message>
Added Logo to Presentation
</commit_message>
<xml_diff>
--- a/docs/Proposal/Proposal Presentation.pptx
+++ b/docs/Proposal/Proposal Presentation.pptx
@@ -3559,29 +3559,1349 @@
           </a:p>
         </p:txBody>
       </p:sp>
-      <p:sp>
-        <p:nvSpPr>
-          <p:cNvPr id="3" name="Title 2"/>
-          <p:cNvSpPr>
-            <a:spLocks noGrp="1"/>
-          </p:cNvSpPr>
-          <p:nvPr>
-            <p:ph type="ctrTitle"/>
-          </p:nvPr>
-        </p:nvSpPr>
-        <p:spPr/>
-        <p:txBody>
-          <a:bodyPr/>
-          <a:lstStyle/>
-          <a:p>
-            <a:r>
-              <a:rPr lang="en-US" dirty="0" smtClean="0"/>
-              <a:t>MAILBIRD</a:t>
-            </a:r>
-            <a:endParaRPr lang="en-US" dirty="0"/>
-          </a:p>
-        </p:txBody>
-      </p:sp>
+      <p:grpSp>
+        <p:nvGrpSpPr>
+          <p:cNvPr id="120" name="Group 119"/>
+          <p:cNvGrpSpPr/>
+          <p:nvPr/>
+        </p:nvGrpSpPr>
+        <p:grpSpPr>
+          <a:xfrm>
+            <a:off x="304800" y="1685337"/>
+            <a:ext cx="8609129" cy="2124663"/>
+            <a:chOff x="0" y="-295863"/>
+            <a:chExt cx="8609129" cy="2124663"/>
+          </a:xfrm>
+        </p:grpSpPr>
+        <p:grpSp>
+          <p:nvGrpSpPr>
+            <p:cNvPr id="121" name="Group 120"/>
+            <p:cNvGrpSpPr/>
+            <p:nvPr/>
+          </p:nvGrpSpPr>
+          <p:grpSpPr>
+            <a:xfrm>
+              <a:off x="0" y="-295863"/>
+              <a:ext cx="8609129" cy="2124663"/>
+              <a:chOff x="0" y="-295863"/>
+              <a:chExt cx="8609129" cy="2124663"/>
+            </a:xfrm>
+          </p:grpSpPr>
+          <p:grpSp>
+            <p:nvGrpSpPr>
+              <p:cNvPr id="123" name="Group 122"/>
+              <p:cNvGrpSpPr/>
+              <p:nvPr/>
+            </p:nvGrpSpPr>
+            <p:grpSpPr>
+              <a:xfrm>
+                <a:off x="0" y="0"/>
+                <a:ext cx="8609129" cy="1828800"/>
+                <a:chOff x="0" y="0"/>
+                <a:chExt cx="8609129" cy="1828800"/>
+              </a:xfrm>
+            </p:grpSpPr>
+            <p:pic>
+              <p:nvPicPr>
+                <p:cNvPr id="143" name="Picture 2"/>
+                <p:cNvPicPr>
+                  <a:picLocks noChangeAspect="1" noChangeArrowheads="1"/>
+                </p:cNvPicPr>
+                <p:nvPr/>
+              </p:nvPicPr>
+              <p:blipFill rotWithShape="1">
+                <a:blip r:embed="rId2">
+                  <a:duotone>
+                    <a:prstClr val="black"/>
+                    <a:srgbClr val="1F497D">
+                      <a:tint val="45000"/>
+                      <a:satMod val="400000"/>
+                    </a:srgbClr>
+                  </a:duotone>
+                  <a:extLst>
+                    <a:ext uri="{BEBA8EAE-BF5A-486C-A8C5-ECC9F3942E4B}">
+                      <a14:imgProps xmlns:a14="http://schemas.microsoft.com/office/drawing/2010/main">
+                        <a14:imgLayer r:embed="rId3">
+                          <a14:imgEffect>
+                            <a14:brightnessContrast bright="-40000" contrast="40000"/>
+                          </a14:imgEffect>
+                        </a14:imgLayer>
+                      </a14:imgProps>
+                    </a:ext>
+                    <a:ext uri="{28A0092B-C50C-407E-A947-70E740481C1C}">
+                      <a14:useLocalDpi xmlns:a14="http://schemas.microsoft.com/office/drawing/2010/main" val="0"/>
+                    </a:ext>
+                  </a:extLst>
+                </a:blip>
+                <a:srcRect b="62235"/>
+                <a:stretch/>
+              </p:blipFill>
+              <p:spPr bwMode="auto">
+                <a:xfrm>
+                  <a:off x="0" y="0"/>
+                  <a:ext cx="8609129" cy="1828800"/>
+                </a:xfrm>
+                <a:prstGeom prst="rect">
+                  <a:avLst/>
+                </a:prstGeom>
+                <a:solidFill>
+                  <a:sysClr val="windowText" lastClr="000000"/>
+                </a:solidFill>
+                <a:ln>
+                  <a:noFill/>
+                </a:ln>
+                <a:extLst/>
+              </p:spPr>
+            </p:pic>
+            <p:sp>
+              <p:nvSpPr>
+                <p:cNvPr id="144" name="TextBox 143"/>
+                <p:cNvSpPr txBox="1"/>
+                <p:nvPr/>
+              </p:nvSpPr>
+              <p:spPr>
+                <a:xfrm>
+                  <a:off x="2849562" y="228600"/>
+                  <a:ext cx="4267200" cy="1107996"/>
+                </a:xfrm>
+                <a:prstGeom prst="rect">
+                  <a:avLst/>
+                </a:prstGeom>
+                <a:noFill/>
+              </p:spPr>
+              <p:txBody>
+                <a:bodyPr wrap="square" rtlCol="0">
+                  <a:spAutoFit/>
+                </a:bodyPr>
+                <a:lstStyle/>
+                <a:p>
+                  <a:pPr marL="0" marR="0" lvl="0" indent="0" defTabSz="595549" eaLnBrk="1" fontAlgn="auto" latinLnBrk="0" hangingPunct="1">
+                    <a:lnSpc>
+                      <a:spcPct val="100000"/>
+                    </a:lnSpc>
+                    <a:spcBef>
+                      <a:spcPts val="0"/>
+                    </a:spcBef>
+                    <a:spcAft>
+                      <a:spcPts val="0"/>
+                    </a:spcAft>
+                    <a:buClrTx/>
+                    <a:buSzTx/>
+                    <a:buFontTx/>
+                    <a:buNone/>
+                    <a:tabLst/>
+                    <a:defRPr/>
+                  </a:pPr>
+                  <a:r>
+                    <a:rPr kumimoji="0" lang="en-US" sz="6600" b="0" i="0" u="none" strike="noStrike" kern="0" cap="none" spc="0" normalizeH="0" baseline="0" noProof="0" dirty="0" smtClean="0">
+                      <a:ln>
+                        <a:noFill/>
+                      </a:ln>
+                      <a:solidFill>
+                        <a:srgbClr val="F79646">
+                          <a:lumMod val="75000"/>
+                        </a:srgbClr>
+                      </a:solidFill>
+                      <a:effectLst/>
+                      <a:uLnTx/>
+                      <a:uFillTx/>
+                      <a:latin typeface="Postmaster" pitchFamily="2" charset="0"/>
+                    </a:rPr>
+                    <a:t>MailBird</a:t>
+                  </a:r>
+                </a:p>
+              </p:txBody>
+            </p:sp>
+            <p:sp>
+              <p:nvSpPr>
+                <p:cNvPr id="145" name="Arc 144"/>
+                <p:cNvSpPr/>
+                <p:nvPr/>
+              </p:nvSpPr>
+              <p:spPr>
+                <a:xfrm rot="5715997">
+                  <a:off x="1175221" y="256121"/>
+                  <a:ext cx="985058" cy="645590"/>
+                </a:xfrm>
+                <a:prstGeom prst="arc">
+                  <a:avLst>
+                    <a:gd name="adj1" fmla="val 14681540"/>
+                    <a:gd name="adj2" fmla="val 19501789"/>
+                  </a:avLst>
+                </a:prstGeom>
+                <a:noFill/>
+                <a:ln w="19050" cap="flat" cmpd="sng" algn="ctr">
+                  <a:solidFill>
+                    <a:srgbClr val="C49100"/>
+                  </a:solidFill>
+                  <a:prstDash val="solid"/>
+                </a:ln>
+                <a:effectLst/>
+              </p:spPr>
+              <p:txBody>
+                <a:bodyPr rtlCol="0" anchor="ctr"/>
+                <a:lstStyle/>
+                <a:p>
+                  <a:pPr marL="0" marR="0" lvl="0" indent="0" algn="ctr" defTabSz="595549" eaLnBrk="1" fontAlgn="auto" latinLnBrk="0" hangingPunct="1">
+                    <a:lnSpc>
+                      <a:spcPct val="100000"/>
+                    </a:lnSpc>
+                    <a:spcBef>
+                      <a:spcPts val="0"/>
+                    </a:spcBef>
+                    <a:spcAft>
+                      <a:spcPts val="0"/>
+                    </a:spcAft>
+                    <a:buClrTx/>
+                    <a:buSzTx/>
+                    <a:buFontTx/>
+                    <a:buNone/>
+                    <a:tabLst/>
+                    <a:defRPr/>
+                  </a:pPr>
+                  <a:endParaRPr kumimoji="0" lang="en-US" sz="1200" b="0" i="0" u="none" strike="noStrike" kern="0" cap="none" spc="0" normalizeH="0" baseline="0" noProof="0" smtClean="0">
+                    <a:ln>
+                      <a:noFill/>
+                    </a:ln>
+                    <a:solidFill>
+                      <a:prstClr val="black"/>
+                    </a:solidFill>
+                    <a:effectLst/>
+                    <a:uLnTx/>
+                    <a:uFillTx/>
+                    <a:latin typeface="Calibri"/>
+                  </a:endParaRPr>
+                </a:p>
+              </p:txBody>
+            </p:sp>
+            <p:pic>
+              <p:nvPicPr>
+                <p:cNvPr id="146" name="Picture 6" descr="http://www.clker.com/cliparts/c/6/0/3/11970931211841280223BenBois_French_parcel_post.svg.med.png"/>
+                <p:cNvPicPr>
+                  <a:picLocks noChangeAspect="1" noChangeArrowheads="1"/>
+                </p:cNvPicPr>
+                <p:nvPr/>
+              </p:nvPicPr>
+              <p:blipFill>
+                <a:blip r:embed="rId4" cstate="print">
+                  <a:extLst>
+                    <a:ext uri="{BEBA8EAE-BF5A-486C-A8C5-ECC9F3942E4B}">
+                      <a14:imgProps xmlns:a14="http://schemas.microsoft.com/office/drawing/2010/main">
+                        <a14:imgLayer r:embed="rId5">
+                          <a14:imgEffect>
+                            <a14:backgroundRemoval t="0" b="100000" l="0" r="100000">
+                              <a14:foregroundMark x1="34100" y1="91333" x2="34100" y2="91333"/>
+                              <a14:foregroundMark x1="49808" y1="97000" x2="49808" y2="97000"/>
+                            </a14:backgroundRemoval>
+                          </a14:imgEffect>
+                        </a14:imgLayer>
+                      </a14:imgProps>
+                    </a:ext>
+                    <a:ext uri="{28A0092B-C50C-407E-A947-70E740481C1C}">
+                      <a14:useLocalDpi xmlns:a14="http://schemas.microsoft.com/office/drawing/2010/main" val="0"/>
+                    </a:ext>
+                  </a:extLst>
+                </a:blip>
+                <a:srcRect/>
+                <a:stretch>
+                  <a:fillRect/>
+                </a:stretch>
+              </p:blipFill>
+              <p:spPr bwMode="auto">
+                <a:xfrm rot="1184416">
+                  <a:off x="1706532" y="709545"/>
+                  <a:ext cx="419438" cy="482113"/>
+                </a:xfrm>
+                <a:prstGeom prst="rect">
+                  <a:avLst/>
+                </a:prstGeom>
+                <a:noFill/>
+                <a:extLst>
+                  <a:ext uri="{909E8E84-426E-40DD-AFC4-6F175D3DCCD1}">
+                    <a14:hiddenFill xmlns:a14="http://schemas.microsoft.com/office/drawing/2010/main">
+                      <a:solidFill>
+                        <a:srgbClr val="FFFFFF"/>
+                      </a:solidFill>
+                    </a14:hiddenFill>
+                  </a:ext>
+                </a:extLst>
+              </p:spPr>
+            </p:pic>
+            <p:sp>
+              <p:nvSpPr>
+                <p:cNvPr id="147" name="Oval 146"/>
+                <p:cNvSpPr/>
+                <p:nvPr/>
+              </p:nvSpPr>
+              <p:spPr>
+                <a:xfrm>
+                  <a:off x="2560002" y="950603"/>
+                  <a:ext cx="214881" cy="219664"/>
+                </a:xfrm>
+                <a:prstGeom prst="ellipse">
+                  <a:avLst/>
+                </a:prstGeom>
+                <a:noFill/>
+                <a:ln w="57150" cap="flat" cmpd="sng" algn="ctr">
+                  <a:solidFill>
+                    <a:srgbClr val="F79646">
+                      <a:lumMod val="75000"/>
+                    </a:srgbClr>
+                  </a:solidFill>
+                  <a:prstDash val="solid"/>
+                </a:ln>
+                <a:effectLst/>
+              </p:spPr>
+              <p:txBody>
+                <a:bodyPr rtlCol="0" anchor="ctr"/>
+                <a:lstStyle/>
+                <a:p>
+                  <a:pPr marL="0" marR="0" lvl="0" indent="0" algn="ctr" defTabSz="595549" eaLnBrk="1" fontAlgn="auto" latinLnBrk="0" hangingPunct="1">
+                    <a:lnSpc>
+                      <a:spcPct val="100000"/>
+                    </a:lnSpc>
+                    <a:spcBef>
+                      <a:spcPts val="0"/>
+                    </a:spcBef>
+                    <a:spcAft>
+                      <a:spcPts val="0"/>
+                    </a:spcAft>
+                    <a:buClrTx/>
+                    <a:buSzTx/>
+                    <a:buFontTx/>
+                    <a:buNone/>
+                    <a:tabLst/>
+                    <a:defRPr/>
+                  </a:pPr>
+                  <a:endParaRPr kumimoji="0" lang="en-US" sz="1200" b="0" i="0" u="none" strike="noStrike" kern="0" cap="none" spc="0" normalizeH="0" baseline="0" noProof="0" smtClean="0">
+                    <a:ln>
+                      <a:noFill/>
+                    </a:ln>
+                    <a:solidFill>
+                      <a:prstClr val="white"/>
+                    </a:solidFill>
+                    <a:effectLst/>
+                    <a:uLnTx/>
+                    <a:uFillTx/>
+                    <a:latin typeface="Calibri"/>
+                  </a:endParaRPr>
+                </a:p>
+              </p:txBody>
+            </p:sp>
+            <p:sp>
+              <p:nvSpPr>
+                <p:cNvPr id="148" name="Freeform 147"/>
+                <p:cNvSpPr/>
+                <p:nvPr/>
+              </p:nvSpPr>
+              <p:spPr>
+                <a:xfrm>
+                  <a:off x="2767611" y="977660"/>
+                  <a:ext cx="304800" cy="235789"/>
+                </a:xfrm>
+                <a:custGeom>
+                  <a:avLst/>
+                  <a:gdLst>
+                    <a:gd name="connsiteX0" fmla="*/ 0 w 304800"/>
+                    <a:gd name="connsiteY0" fmla="*/ 0 h 235789"/>
+                    <a:gd name="connsiteX1" fmla="*/ 63260 w 304800"/>
+                    <a:gd name="connsiteY1" fmla="*/ 155276 h 235789"/>
+                    <a:gd name="connsiteX2" fmla="*/ 304800 w 304800"/>
+                    <a:gd name="connsiteY2" fmla="*/ 235789 h 235789"/>
+                    <a:gd name="connsiteX3" fmla="*/ 304800 w 304800"/>
+                    <a:gd name="connsiteY3" fmla="*/ 235789 h 235789"/>
+                    <a:gd name="connsiteX0" fmla="*/ 0 w 304800"/>
+                    <a:gd name="connsiteY0" fmla="*/ 0 h 235789"/>
+                    <a:gd name="connsiteX1" fmla="*/ 70880 w 304800"/>
+                    <a:gd name="connsiteY1" fmla="*/ 204806 h 235789"/>
+                    <a:gd name="connsiteX2" fmla="*/ 304800 w 304800"/>
+                    <a:gd name="connsiteY2" fmla="*/ 235789 h 235789"/>
+                    <a:gd name="connsiteX3" fmla="*/ 304800 w 304800"/>
+                    <a:gd name="connsiteY3" fmla="*/ 235789 h 235789"/>
+                  </a:gdLst>
+                  <a:ahLst/>
+                  <a:cxnLst>
+                    <a:cxn ang="0">
+                      <a:pos x="connsiteX0" y="connsiteY0"/>
+                    </a:cxn>
+                    <a:cxn ang="0">
+                      <a:pos x="connsiteX1" y="connsiteY1"/>
+                    </a:cxn>
+                    <a:cxn ang="0">
+                      <a:pos x="connsiteX2" y="connsiteY2"/>
+                    </a:cxn>
+                    <a:cxn ang="0">
+                      <a:pos x="connsiteX3" y="connsiteY3"/>
+                    </a:cxn>
+                  </a:cxnLst>
+                  <a:rect l="l" t="t" r="r" b="b"/>
+                  <a:pathLst>
+                    <a:path w="304800" h="235789">
+                      <a:moveTo>
+                        <a:pt x="0" y="0"/>
+                      </a:moveTo>
+                      <a:cubicBezTo>
+                        <a:pt x="6230" y="57989"/>
+                        <a:pt x="20080" y="165508"/>
+                        <a:pt x="70880" y="204806"/>
+                      </a:cubicBezTo>
+                      <a:cubicBezTo>
+                        <a:pt x="121680" y="244104"/>
+                        <a:pt x="265813" y="230625"/>
+                        <a:pt x="304800" y="235789"/>
+                      </a:cubicBezTo>
+                      <a:lnTo>
+                        <a:pt x="304800" y="235789"/>
+                      </a:lnTo>
+                    </a:path>
+                  </a:pathLst>
+                </a:custGeom>
+                <a:noFill/>
+                <a:ln w="19050" cap="flat" cmpd="sng" algn="ctr">
+                  <a:solidFill>
+                    <a:srgbClr val="F79646">
+                      <a:lumMod val="75000"/>
+                    </a:srgbClr>
+                  </a:solidFill>
+                  <a:prstDash val="solid"/>
+                </a:ln>
+                <a:effectLst/>
+              </p:spPr>
+              <p:txBody>
+                <a:bodyPr rtlCol="0" anchor="ctr"/>
+                <a:lstStyle/>
+                <a:p>
+                  <a:pPr marL="0" marR="0" lvl="0" indent="0" algn="ctr" defTabSz="595549" eaLnBrk="1" fontAlgn="auto" latinLnBrk="0" hangingPunct="1">
+                    <a:lnSpc>
+                      <a:spcPct val="100000"/>
+                    </a:lnSpc>
+                    <a:spcBef>
+                      <a:spcPts val="0"/>
+                    </a:spcBef>
+                    <a:spcAft>
+                      <a:spcPts val="0"/>
+                    </a:spcAft>
+                    <a:buClrTx/>
+                    <a:buSzTx/>
+                    <a:buFontTx/>
+                    <a:buNone/>
+                    <a:tabLst/>
+                    <a:defRPr/>
+                  </a:pPr>
+                  <a:endParaRPr kumimoji="0" lang="en-US" sz="1200" b="0" i="0" u="none" strike="noStrike" kern="0" cap="none" spc="0" normalizeH="0" baseline="0" noProof="0" smtClean="0">
+                    <a:ln>
+                      <a:noFill/>
+                    </a:ln>
+                    <a:solidFill>
+                      <a:srgbClr val="F79646">
+                        <a:lumMod val="75000"/>
+                      </a:srgbClr>
+                    </a:solidFill>
+                    <a:effectLst/>
+                    <a:uLnTx/>
+                    <a:uFillTx/>
+                    <a:latin typeface="Calibri"/>
+                  </a:endParaRPr>
+                </a:p>
+              </p:txBody>
+            </p:sp>
+          </p:grpSp>
+          <p:grpSp>
+            <p:nvGrpSpPr>
+              <p:cNvPr id="124" name="Group 123"/>
+              <p:cNvGrpSpPr/>
+              <p:nvPr/>
+            </p:nvGrpSpPr>
+            <p:grpSpPr>
+              <a:xfrm>
+                <a:off x="1184547" y="-295863"/>
+                <a:ext cx="1654920" cy="1506126"/>
+                <a:chOff x="915399" y="47038"/>
+                <a:chExt cx="1654920" cy="1506126"/>
+              </a:xfrm>
+              <a:scene3d>
+                <a:camera prst="perspectiveContrastingLeftFacing">
+                  <a:rot lat="18643866" lon="17374432" rev="5104693"/>
+                </a:camera>
+                <a:lightRig rig="threePt" dir="t"/>
+              </a:scene3d>
+            </p:grpSpPr>
+            <p:sp>
+              <p:nvSpPr>
+                <p:cNvPr id="125" name="Oval 124"/>
+                <p:cNvSpPr/>
+                <p:nvPr/>
+              </p:nvSpPr>
+              <p:spPr>
+                <a:xfrm>
+                  <a:off x="1554162" y="1143000"/>
+                  <a:ext cx="381000" cy="381000"/>
+                </a:xfrm>
+                <a:prstGeom prst="ellipse">
+                  <a:avLst/>
+                </a:prstGeom>
+                <a:noFill/>
+                <a:ln w="38100" cap="flat" cmpd="sng" algn="ctr">
+                  <a:solidFill>
+                    <a:sysClr val="window" lastClr="FFFFFF"/>
+                  </a:solidFill>
+                  <a:prstDash val="solid"/>
+                </a:ln>
+                <a:effectLst/>
+              </p:spPr>
+              <p:txBody>
+                <a:bodyPr rtlCol="0" anchor="ctr"/>
+                <a:lstStyle/>
+                <a:p>
+                  <a:pPr marL="0" marR="0" lvl="0" indent="0" algn="ctr" defTabSz="595549" eaLnBrk="1" fontAlgn="auto" latinLnBrk="0" hangingPunct="1">
+                    <a:lnSpc>
+                      <a:spcPct val="100000"/>
+                    </a:lnSpc>
+                    <a:spcBef>
+                      <a:spcPts val="0"/>
+                    </a:spcBef>
+                    <a:spcAft>
+                      <a:spcPts val="0"/>
+                    </a:spcAft>
+                    <a:buClrTx/>
+                    <a:buSzTx/>
+                    <a:buFontTx/>
+                    <a:buNone/>
+                    <a:tabLst/>
+                    <a:defRPr/>
+                  </a:pPr>
+                  <a:endParaRPr kumimoji="0" lang="en-US" sz="1200" b="0" i="0" u="none" strike="noStrike" kern="0" cap="none" spc="0" normalizeH="0" baseline="0" noProof="0" smtClean="0">
+                    <a:ln>
+                      <a:noFill/>
+                    </a:ln>
+                    <a:solidFill>
+                      <a:prstClr val="white"/>
+                    </a:solidFill>
+                    <a:effectLst/>
+                    <a:uLnTx/>
+                    <a:uFillTx/>
+                    <a:latin typeface="Calibri"/>
+                  </a:endParaRPr>
+                </a:p>
+              </p:txBody>
+            </p:sp>
+            <p:sp>
+              <p:nvSpPr>
+                <p:cNvPr id="126" name="Oval 125"/>
+                <p:cNvSpPr/>
+                <p:nvPr/>
+              </p:nvSpPr>
+              <p:spPr>
+                <a:xfrm>
+                  <a:off x="944562" y="592098"/>
+                  <a:ext cx="381000" cy="381000"/>
+                </a:xfrm>
+                <a:prstGeom prst="ellipse">
+                  <a:avLst/>
+                </a:prstGeom>
+                <a:noFill/>
+                <a:ln w="38100" cap="flat" cmpd="sng" algn="ctr">
+                  <a:solidFill>
+                    <a:sysClr val="window" lastClr="FFFFFF"/>
+                  </a:solidFill>
+                  <a:prstDash val="solid"/>
+                </a:ln>
+                <a:effectLst/>
+              </p:spPr>
+              <p:txBody>
+                <a:bodyPr rtlCol="0" anchor="ctr"/>
+                <a:lstStyle/>
+                <a:p>
+                  <a:pPr marL="0" marR="0" lvl="0" indent="0" algn="ctr" defTabSz="595549" eaLnBrk="1" fontAlgn="auto" latinLnBrk="0" hangingPunct="1">
+                    <a:lnSpc>
+                      <a:spcPct val="100000"/>
+                    </a:lnSpc>
+                    <a:spcBef>
+                      <a:spcPts val="0"/>
+                    </a:spcBef>
+                    <a:spcAft>
+                      <a:spcPts val="0"/>
+                    </a:spcAft>
+                    <a:buClrTx/>
+                    <a:buSzTx/>
+                    <a:buFontTx/>
+                    <a:buNone/>
+                    <a:tabLst/>
+                    <a:defRPr/>
+                  </a:pPr>
+                  <a:endParaRPr kumimoji="0" lang="en-US" sz="1200" b="0" i="0" u="none" strike="noStrike" kern="0" cap="none" spc="0" normalizeH="0" baseline="0" noProof="0" smtClean="0">
+                    <a:ln>
+                      <a:noFill/>
+                    </a:ln>
+                    <a:solidFill>
+                      <a:prstClr val="white"/>
+                    </a:solidFill>
+                    <a:effectLst/>
+                    <a:uLnTx/>
+                    <a:uFillTx/>
+                    <a:latin typeface="Calibri"/>
+                  </a:endParaRPr>
+                </a:p>
+              </p:txBody>
+            </p:sp>
+            <p:sp>
+              <p:nvSpPr>
+                <p:cNvPr id="127" name="Oval 126"/>
+                <p:cNvSpPr/>
+                <p:nvPr/>
+              </p:nvSpPr>
+              <p:spPr>
+                <a:xfrm>
+                  <a:off x="2163762" y="592275"/>
+                  <a:ext cx="381000" cy="381000"/>
+                </a:xfrm>
+                <a:prstGeom prst="ellipse">
+                  <a:avLst/>
+                </a:prstGeom>
+                <a:noFill/>
+                <a:ln w="38100" cap="sq" cmpd="sng" algn="ctr">
+                  <a:solidFill>
+                    <a:sysClr val="window" lastClr="FFFFFF"/>
+                  </a:solidFill>
+                  <a:prstDash val="solid"/>
+                  <a:round/>
+                </a:ln>
+                <a:effectLst/>
+              </p:spPr>
+              <p:txBody>
+                <a:bodyPr rtlCol="0" anchor="ctr"/>
+                <a:lstStyle/>
+                <a:p>
+                  <a:pPr marL="0" marR="0" lvl="0" indent="0" algn="ctr" defTabSz="595549" eaLnBrk="1" fontAlgn="auto" latinLnBrk="0" hangingPunct="1">
+                    <a:lnSpc>
+                      <a:spcPct val="100000"/>
+                    </a:lnSpc>
+                    <a:spcBef>
+                      <a:spcPts val="0"/>
+                    </a:spcBef>
+                    <a:spcAft>
+                      <a:spcPts val="0"/>
+                    </a:spcAft>
+                    <a:buClrTx/>
+                    <a:buSzTx/>
+                    <a:buFontTx/>
+                    <a:buNone/>
+                    <a:tabLst/>
+                    <a:defRPr/>
+                  </a:pPr>
+                  <a:endParaRPr kumimoji="0" lang="en-US" sz="1200" b="0" i="0" u="none" strike="noStrike" kern="0" cap="none" spc="0" normalizeH="0" baseline="0" noProof="0" smtClean="0">
+                    <a:ln>
+                      <a:noFill/>
+                    </a:ln>
+                    <a:solidFill>
+                      <a:prstClr val="white"/>
+                    </a:solidFill>
+                    <a:effectLst/>
+                    <a:uLnTx/>
+                    <a:uFillTx/>
+                    <a:latin typeface="Calibri"/>
+                  </a:endParaRPr>
+                </a:p>
+              </p:txBody>
+            </p:sp>
+            <p:sp>
+              <p:nvSpPr>
+                <p:cNvPr id="128" name="Oval 127"/>
+                <p:cNvSpPr/>
+                <p:nvPr/>
+              </p:nvSpPr>
+              <p:spPr>
+                <a:xfrm>
+                  <a:off x="1554162" y="76200"/>
+                  <a:ext cx="381000" cy="381000"/>
+                </a:xfrm>
+                <a:prstGeom prst="ellipse">
+                  <a:avLst/>
+                </a:prstGeom>
+                <a:noFill/>
+                <a:ln w="38100" cap="flat" cmpd="sng" algn="ctr">
+                  <a:solidFill>
+                    <a:sysClr val="window" lastClr="FFFFFF"/>
+                  </a:solidFill>
+                  <a:prstDash val="solid"/>
+                </a:ln>
+                <a:effectLst/>
+              </p:spPr>
+              <p:txBody>
+                <a:bodyPr rtlCol="0" anchor="ctr"/>
+                <a:lstStyle/>
+                <a:p>
+                  <a:pPr marL="0" marR="0" lvl="0" indent="0" algn="ctr" defTabSz="595549" eaLnBrk="1" fontAlgn="auto" latinLnBrk="0" hangingPunct="1">
+                    <a:lnSpc>
+                      <a:spcPct val="100000"/>
+                    </a:lnSpc>
+                    <a:spcBef>
+                      <a:spcPts val="0"/>
+                    </a:spcBef>
+                    <a:spcAft>
+                      <a:spcPts val="0"/>
+                    </a:spcAft>
+                    <a:buClrTx/>
+                    <a:buSzTx/>
+                    <a:buFontTx/>
+                    <a:buNone/>
+                    <a:tabLst/>
+                    <a:defRPr/>
+                  </a:pPr>
+                  <a:endParaRPr kumimoji="0" lang="en-US" sz="1200" b="0" i="0" u="none" strike="noStrike" kern="0" cap="none" spc="0" normalizeH="0" baseline="0" noProof="0" smtClean="0">
+                    <a:ln>
+                      <a:noFill/>
+                    </a:ln>
+                    <a:solidFill>
+                      <a:prstClr val="white"/>
+                    </a:solidFill>
+                    <a:effectLst/>
+                    <a:uLnTx/>
+                    <a:uFillTx/>
+                    <a:latin typeface="Calibri"/>
+                  </a:endParaRPr>
+                </a:p>
+              </p:txBody>
+            </p:sp>
+            <p:cxnSp>
+              <p:nvCxnSpPr>
+                <p:cNvPr id="129" name="Straight Connector 128"/>
+                <p:cNvCxnSpPr>
+                  <a:stCxn id="128" idx="4"/>
+                  <a:endCxn id="125" idx="0"/>
+                </p:cNvCxnSpPr>
+                <p:nvPr/>
+              </p:nvCxnSpPr>
+              <p:spPr>
+                <a:xfrm>
+                  <a:off x="1744662" y="457200"/>
+                  <a:ext cx="0" cy="685800"/>
+                </a:xfrm>
+                <a:prstGeom prst="line">
+                  <a:avLst/>
+                </a:prstGeom>
+                <a:noFill/>
+                <a:ln w="38100" cap="flat" cmpd="sng" algn="ctr">
+                  <a:solidFill>
+                    <a:sysClr val="window" lastClr="FFFFFF"/>
+                  </a:solidFill>
+                  <a:prstDash val="solid"/>
+                </a:ln>
+                <a:effectLst/>
+              </p:spPr>
+            </p:cxnSp>
+            <p:cxnSp>
+              <p:nvCxnSpPr>
+                <p:cNvPr id="130" name="Straight Connector 129"/>
+                <p:cNvCxnSpPr>
+                  <a:stCxn id="126" idx="6"/>
+                  <a:endCxn id="127" idx="2"/>
+                </p:cNvCxnSpPr>
+                <p:nvPr/>
+              </p:nvCxnSpPr>
+              <p:spPr>
+                <a:xfrm>
+                  <a:off x="1325562" y="782598"/>
+                  <a:ext cx="838200" cy="177"/>
+                </a:xfrm>
+                <a:prstGeom prst="line">
+                  <a:avLst/>
+                </a:prstGeom>
+                <a:noFill/>
+                <a:ln w="38100" cap="flat" cmpd="sng" algn="ctr">
+                  <a:solidFill>
+                    <a:sysClr val="window" lastClr="FFFFFF"/>
+                  </a:solidFill>
+                  <a:prstDash val="solid"/>
+                </a:ln>
+                <a:effectLst/>
+              </p:spPr>
+            </p:cxnSp>
+            <p:grpSp>
+              <p:nvGrpSpPr>
+                <p:cNvPr id="131" name="Group 130"/>
+                <p:cNvGrpSpPr/>
+                <p:nvPr/>
+              </p:nvGrpSpPr>
+              <p:grpSpPr>
+                <a:xfrm>
+                  <a:off x="2511993" y="726996"/>
+                  <a:ext cx="58326" cy="71487"/>
+                  <a:chOff x="2511993" y="726996"/>
+                  <a:chExt cx="58326" cy="71487"/>
+                </a:xfrm>
+              </p:grpSpPr>
+              <p:sp>
+                <p:nvSpPr>
+                  <p:cNvPr id="141" name="Isosceles Triangle 140"/>
+                  <p:cNvSpPr/>
+                  <p:nvPr/>
+                </p:nvSpPr>
+                <p:spPr>
+                  <a:xfrm>
+                    <a:off x="2513169" y="726996"/>
+                    <a:ext cx="57150" cy="55602"/>
+                  </a:xfrm>
+                  <a:prstGeom prst="triangle">
+                    <a:avLst/>
+                  </a:prstGeom>
+                  <a:solidFill>
+                    <a:sysClr val="window" lastClr="FFFFFF"/>
+                  </a:solidFill>
+                  <a:ln w="12700" cap="flat" cmpd="sng" algn="ctr">
+                    <a:solidFill>
+                      <a:srgbClr val="1F497D">
+                        <a:lumMod val="50000"/>
+                      </a:srgbClr>
+                    </a:solidFill>
+                    <a:prstDash val="solid"/>
+                  </a:ln>
+                  <a:effectLst/>
+                </p:spPr>
+                <p:txBody>
+                  <a:bodyPr rtlCol="0" anchor="ctr"/>
+                  <a:lstStyle/>
+                  <a:p>
+                    <a:pPr marL="0" marR="0" lvl="0" indent="0" algn="ctr" defTabSz="595549" eaLnBrk="1" fontAlgn="auto" latinLnBrk="0" hangingPunct="1">
+                      <a:lnSpc>
+                        <a:spcPct val="100000"/>
+                      </a:lnSpc>
+                      <a:spcBef>
+                        <a:spcPts val="0"/>
+                      </a:spcBef>
+                      <a:spcAft>
+                        <a:spcPts val="0"/>
+                      </a:spcAft>
+                      <a:buClrTx/>
+                      <a:buSzTx/>
+                      <a:buFontTx/>
+                      <a:buNone/>
+                      <a:tabLst/>
+                      <a:defRPr/>
+                    </a:pPr>
+                    <a:endParaRPr kumimoji="0" lang="en-US" sz="1200" b="0" i="0" u="none" strike="noStrike" kern="0" cap="none" spc="0" normalizeH="0" baseline="0" noProof="0" smtClean="0">
+                      <a:ln>
+                        <a:noFill/>
+                      </a:ln>
+                      <a:solidFill>
+                        <a:prstClr val="white"/>
+                      </a:solidFill>
+                      <a:effectLst/>
+                      <a:uLnTx/>
+                      <a:uFillTx/>
+                      <a:latin typeface="Calibri"/>
+                    </a:endParaRPr>
+                  </a:p>
+                </p:txBody>
+              </p:sp>
+              <p:sp>
+                <p:nvSpPr>
+                  <p:cNvPr id="142" name="Isosceles Triangle 141"/>
+                  <p:cNvSpPr/>
+                  <p:nvPr/>
+                </p:nvSpPr>
+                <p:spPr>
+                  <a:xfrm>
+                    <a:off x="2511993" y="742881"/>
+                    <a:ext cx="57150" cy="55602"/>
+                  </a:xfrm>
+                  <a:prstGeom prst="triangle">
+                    <a:avLst/>
+                  </a:prstGeom>
+                  <a:solidFill>
+                    <a:sysClr val="window" lastClr="FFFFFF"/>
+                  </a:solidFill>
+                  <a:ln w="12700" cap="flat" cmpd="sng" algn="ctr">
+                    <a:solidFill>
+                      <a:sysClr val="window" lastClr="FFFFFF"/>
+                    </a:solidFill>
+                    <a:prstDash val="solid"/>
+                  </a:ln>
+                  <a:effectLst/>
+                </p:spPr>
+                <p:txBody>
+                  <a:bodyPr rtlCol="0" anchor="ctr"/>
+                  <a:lstStyle/>
+                  <a:p>
+                    <a:pPr marL="0" marR="0" lvl="0" indent="0" algn="ctr" defTabSz="595549" eaLnBrk="1" fontAlgn="auto" latinLnBrk="0" hangingPunct="1">
+                      <a:lnSpc>
+                        <a:spcPct val="100000"/>
+                      </a:lnSpc>
+                      <a:spcBef>
+                        <a:spcPts val="0"/>
+                      </a:spcBef>
+                      <a:spcAft>
+                        <a:spcPts val="0"/>
+                      </a:spcAft>
+                      <a:buClrTx/>
+                      <a:buSzTx/>
+                      <a:buFontTx/>
+                      <a:buNone/>
+                      <a:tabLst/>
+                      <a:defRPr/>
+                    </a:pPr>
+                    <a:endParaRPr kumimoji="0" lang="en-US" sz="1200" b="0" i="0" u="none" strike="noStrike" kern="0" cap="none" spc="0" normalizeH="0" baseline="0" noProof="0" smtClean="0">
+                      <a:ln>
+                        <a:noFill/>
+                      </a:ln>
+                      <a:solidFill>
+                        <a:prstClr val="white"/>
+                      </a:solidFill>
+                      <a:effectLst/>
+                      <a:uLnTx/>
+                      <a:uFillTx/>
+                      <a:latin typeface="Calibri"/>
+                    </a:endParaRPr>
+                  </a:p>
+                </p:txBody>
+              </p:sp>
+            </p:grpSp>
+            <p:grpSp>
+              <p:nvGrpSpPr>
+                <p:cNvPr id="132" name="Group 131"/>
+                <p:cNvGrpSpPr/>
+                <p:nvPr/>
+              </p:nvGrpSpPr>
+              <p:grpSpPr>
+                <a:xfrm rot="10800000">
+                  <a:off x="915399" y="761922"/>
+                  <a:ext cx="58326" cy="71487"/>
+                  <a:chOff x="2511993" y="726996"/>
+                  <a:chExt cx="58326" cy="71487"/>
+                </a:xfrm>
+              </p:grpSpPr>
+              <p:sp>
+                <p:nvSpPr>
+                  <p:cNvPr id="139" name="Isosceles Triangle 138"/>
+                  <p:cNvSpPr/>
+                  <p:nvPr/>
+                </p:nvSpPr>
+                <p:spPr>
+                  <a:xfrm>
+                    <a:off x="2513169" y="726996"/>
+                    <a:ext cx="57150" cy="55602"/>
+                  </a:xfrm>
+                  <a:prstGeom prst="triangle">
+                    <a:avLst/>
+                  </a:prstGeom>
+                  <a:solidFill>
+                    <a:sysClr val="window" lastClr="FFFFFF"/>
+                  </a:solidFill>
+                  <a:ln w="12700" cap="flat" cmpd="sng" algn="ctr">
+                    <a:solidFill>
+                      <a:srgbClr val="1F497D">
+                        <a:lumMod val="50000"/>
+                      </a:srgbClr>
+                    </a:solidFill>
+                    <a:prstDash val="solid"/>
+                  </a:ln>
+                  <a:effectLst/>
+                </p:spPr>
+                <p:txBody>
+                  <a:bodyPr rtlCol="0" anchor="ctr"/>
+                  <a:lstStyle/>
+                  <a:p>
+                    <a:pPr marL="0" marR="0" lvl="0" indent="0" algn="ctr" defTabSz="595549" eaLnBrk="1" fontAlgn="auto" latinLnBrk="0" hangingPunct="1">
+                      <a:lnSpc>
+                        <a:spcPct val="100000"/>
+                      </a:lnSpc>
+                      <a:spcBef>
+                        <a:spcPts val="0"/>
+                      </a:spcBef>
+                      <a:spcAft>
+                        <a:spcPts val="0"/>
+                      </a:spcAft>
+                      <a:buClrTx/>
+                      <a:buSzTx/>
+                      <a:buFontTx/>
+                      <a:buNone/>
+                      <a:tabLst/>
+                      <a:defRPr/>
+                    </a:pPr>
+                    <a:endParaRPr kumimoji="0" lang="en-US" sz="1200" b="0" i="0" u="none" strike="noStrike" kern="0" cap="none" spc="0" normalizeH="0" baseline="0" noProof="0" smtClean="0">
+                      <a:ln>
+                        <a:noFill/>
+                      </a:ln>
+                      <a:solidFill>
+                        <a:prstClr val="white"/>
+                      </a:solidFill>
+                      <a:effectLst/>
+                      <a:uLnTx/>
+                      <a:uFillTx/>
+                      <a:latin typeface="Calibri"/>
+                    </a:endParaRPr>
+                  </a:p>
+                </p:txBody>
+              </p:sp>
+              <p:sp>
+                <p:nvSpPr>
+                  <p:cNvPr id="140" name="Isosceles Triangle 139"/>
+                  <p:cNvSpPr/>
+                  <p:nvPr/>
+                </p:nvSpPr>
+                <p:spPr>
+                  <a:xfrm>
+                    <a:off x="2511993" y="742881"/>
+                    <a:ext cx="57150" cy="55602"/>
+                  </a:xfrm>
+                  <a:prstGeom prst="triangle">
+                    <a:avLst/>
+                  </a:prstGeom>
+                  <a:solidFill>
+                    <a:sysClr val="window" lastClr="FFFFFF"/>
+                  </a:solidFill>
+                  <a:ln w="12700" cap="flat" cmpd="sng" algn="ctr">
+                    <a:solidFill>
+                      <a:sysClr val="window" lastClr="FFFFFF"/>
+                    </a:solidFill>
+                    <a:prstDash val="solid"/>
+                  </a:ln>
+                  <a:effectLst/>
+                </p:spPr>
+                <p:txBody>
+                  <a:bodyPr rtlCol="0" anchor="ctr"/>
+                  <a:lstStyle/>
+                  <a:p>
+                    <a:pPr marL="0" marR="0" lvl="0" indent="0" algn="ctr" defTabSz="595549" eaLnBrk="1" fontAlgn="auto" latinLnBrk="0" hangingPunct="1">
+                      <a:lnSpc>
+                        <a:spcPct val="100000"/>
+                      </a:lnSpc>
+                      <a:spcBef>
+                        <a:spcPts val="0"/>
+                      </a:spcBef>
+                      <a:spcAft>
+                        <a:spcPts val="0"/>
+                      </a:spcAft>
+                      <a:buClrTx/>
+                      <a:buSzTx/>
+                      <a:buFontTx/>
+                      <a:buNone/>
+                      <a:tabLst/>
+                      <a:defRPr/>
+                    </a:pPr>
+                    <a:endParaRPr kumimoji="0" lang="en-US" sz="1200" b="0" i="0" u="none" strike="noStrike" kern="0" cap="none" spc="0" normalizeH="0" baseline="0" noProof="0" smtClean="0">
+                      <a:ln>
+                        <a:noFill/>
+                      </a:ln>
+                      <a:solidFill>
+                        <a:prstClr val="white"/>
+                      </a:solidFill>
+                      <a:effectLst/>
+                      <a:uLnTx/>
+                      <a:uFillTx/>
+                      <a:latin typeface="Calibri"/>
+                    </a:endParaRPr>
+                  </a:p>
+                </p:txBody>
+              </p:sp>
+            </p:grpSp>
+            <p:grpSp>
+              <p:nvGrpSpPr>
+                <p:cNvPr id="133" name="Group 132"/>
+                <p:cNvGrpSpPr/>
+                <p:nvPr/>
+              </p:nvGrpSpPr>
+              <p:grpSpPr>
+                <a:xfrm rot="16200000" flipH="1">
+                  <a:off x="1707556" y="1488257"/>
+                  <a:ext cx="58326" cy="71487"/>
+                  <a:chOff x="2511993" y="726996"/>
+                  <a:chExt cx="58326" cy="71487"/>
+                </a:xfrm>
+              </p:grpSpPr>
+              <p:sp>
+                <p:nvSpPr>
+                  <p:cNvPr id="137" name="Isosceles Triangle 136"/>
+                  <p:cNvSpPr/>
+                  <p:nvPr/>
+                </p:nvSpPr>
+                <p:spPr>
+                  <a:xfrm>
+                    <a:off x="2513169" y="726996"/>
+                    <a:ext cx="57150" cy="55602"/>
+                  </a:xfrm>
+                  <a:prstGeom prst="triangle">
+                    <a:avLst/>
+                  </a:prstGeom>
+                  <a:solidFill>
+                    <a:sysClr val="window" lastClr="FFFFFF"/>
+                  </a:solidFill>
+                  <a:ln w="12700" cap="flat" cmpd="sng" algn="ctr">
+                    <a:solidFill>
+                      <a:srgbClr val="1F497D">
+                        <a:lumMod val="50000"/>
+                      </a:srgbClr>
+                    </a:solidFill>
+                    <a:prstDash val="solid"/>
+                  </a:ln>
+                  <a:effectLst/>
+                </p:spPr>
+                <p:txBody>
+                  <a:bodyPr rtlCol="0" anchor="ctr"/>
+                  <a:lstStyle/>
+                  <a:p>
+                    <a:pPr marL="0" marR="0" lvl="0" indent="0" algn="ctr" defTabSz="595549" eaLnBrk="1" fontAlgn="auto" latinLnBrk="0" hangingPunct="1">
+                      <a:lnSpc>
+                        <a:spcPct val="100000"/>
+                      </a:lnSpc>
+                      <a:spcBef>
+                        <a:spcPts val="0"/>
+                      </a:spcBef>
+                      <a:spcAft>
+                        <a:spcPts val="0"/>
+                      </a:spcAft>
+                      <a:buClrTx/>
+                      <a:buSzTx/>
+                      <a:buFontTx/>
+                      <a:buNone/>
+                      <a:tabLst/>
+                      <a:defRPr/>
+                    </a:pPr>
+                    <a:endParaRPr kumimoji="0" lang="en-US" sz="1200" b="0" i="0" u="none" strike="noStrike" kern="0" cap="none" spc="0" normalizeH="0" baseline="0" noProof="0" smtClean="0">
+                      <a:ln>
+                        <a:noFill/>
+                      </a:ln>
+                      <a:solidFill>
+                        <a:prstClr val="white"/>
+                      </a:solidFill>
+                      <a:effectLst/>
+                      <a:uLnTx/>
+                      <a:uFillTx/>
+                      <a:latin typeface="Calibri"/>
+                    </a:endParaRPr>
+                  </a:p>
+                </p:txBody>
+              </p:sp>
+              <p:sp>
+                <p:nvSpPr>
+                  <p:cNvPr id="138" name="Isosceles Triangle 137"/>
+                  <p:cNvSpPr/>
+                  <p:nvPr/>
+                </p:nvSpPr>
+                <p:spPr>
+                  <a:xfrm>
+                    <a:off x="2511993" y="742881"/>
+                    <a:ext cx="57150" cy="55602"/>
+                  </a:xfrm>
+                  <a:prstGeom prst="triangle">
+                    <a:avLst/>
+                  </a:prstGeom>
+                  <a:solidFill>
+                    <a:sysClr val="window" lastClr="FFFFFF"/>
+                  </a:solidFill>
+                  <a:ln w="12700" cap="flat" cmpd="sng" algn="ctr">
+                    <a:solidFill>
+                      <a:sysClr val="window" lastClr="FFFFFF"/>
+                    </a:solidFill>
+                    <a:prstDash val="solid"/>
+                  </a:ln>
+                  <a:effectLst/>
+                </p:spPr>
+                <p:txBody>
+                  <a:bodyPr rtlCol="0" anchor="ctr"/>
+                  <a:lstStyle/>
+                  <a:p>
+                    <a:pPr marL="0" marR="0" lvl="0" indent="0" algn="ctr" defTabSz="595549" eaLnBrk="1" fontAlgn="auto" latinLnBrk="0" hangingPunct="1">
+                      <a:lnSpc>
+                        <a:spcPct val="100000"/>
+                      </a:lnSpc>
+                      <a:spcBef>
+                        <a:spcPts val="0"/>
+                      </a:spcBef>
+                      <a:spcAft>
+                        <a:spcPts val="0"/>
+                      </a:spcAft>
+                      <a:buClrTx/>
+                      <a:buSzTx/>
+                      <a:buFontTx/>
+                      <a:buNone/>
+                      <a:tabLst/>
+                      <a:defRPr/>
+                    </a:pPr>
+                    <a:endParaRPr kumimoji="0" lang="en-US" sz="1200" b="0" i="0" u="none" strike="noStrike" kern="0" cap="none" spc="0" normalizeH="0" baseline="0" noProof="0" smtClean="0">
+                      <a:ln>
+                        <a:noFill/>
+                      </a:ln>
+                      <a:solidFill>
+                        <a:prstClr val="white"/>
+                      </a:solidFill>
+                      <a:effectLst/>
+                      <a:uLnTx/>
+                      <a:uFillTx/>
+                      <a:latin typeface="Calibri"/>
+                    </a:endParaRPr>
+                  </a:p>
+                </p:txBody>
+              </p:sp>
+            </p:grpSp>
+            <p:grpSp>
+              <p:nvGrpSpPr>
+                <p:cNvPr id="134" name="Group 133"/>
+                <p:cNvGrpSpPr/>
+                <p:nvPr/>
+              </p:nvGrpSpPr>
+              <p:grpSpPr>
+                <a:xfrm rot="16200000" flipH="1">
+                  <a:off x="1691672" y="40457"/>
+                  <a:ext cx="58326" cy="71487"/>
+                  <a:chOff x="2511993" y="726996"/>
+                  <a:chExt cx="58326" cy="71487"/>
+                </a:xfrm>
+              </p:grpSpPr>
+              <p:sp>
+                <p:nvSpPr>
+                  <p:cNvPr id="135" name="Isosceles Triangle 134"/>
+                  <p:cNvSpPr/>
+                  <p:nvPr/>
+                </p:nvSpPr>
+                <p:spPr>
+                  <a:xfrm>
+                    <a:off x="2513169" y="726996"/>
+                    <a:ext cx="57150" cy="55602"/>
+                  </a:xfrm>
+                  <a:prstGeom prst="triangle">
+                    <a:avLst/>
+                  </a:prstGeom>
+                  <a:solidFill>
+                    <a:sysClr val="window" lastClr="FFFFFF"/>
+                  </a:solidFill>
+                  <a:ln w="12700" cap="flat" cmpd="sng" algn="ctr">
+                    <a:solidFill>
+                      <a:srgbClr val="1F497D">
+                        <a:lumMod val="50000"/>
+                      </a:srgbClr>
+                    </a:solidFill>
+                    <a:prstDash val="solid"/>
+                  </a:ln>
+                  <a:effectLst/>
+                </p:spPr>
+                <p:txBody>
+                  <a:bodyPr rtlCol="0" anchor="ctr"/>
+                  <a:lstStyle/>
+                  <a:p>
+                    <a:pPr marL="0" marR="0" lvl="0" indent="0" algn="ctr" defTabSz="595549" eaLnBrk="1" fontAlgn="auto" latinLnBrk="0" hangingPunct="1">
+                      <a:lnSpc>
+                        <a:spcPct val="100000"/>
+                      </a:lnSpc>
+                      <a:spcBef>
+                        <a:spcPts val="0"/>
+                      </a:spcBef>
+                      <a:spcAft>
+                        <a:spcPts val="0"/>
+                      </a:spcAft>
+                      <a:buClrTx/>
+                      <a:buSzTx/>
+                      <a:buFontTx/>
+                      <a:buNone/>
+                      <a:tabLst/>
+                      <a:defRPr/>
+                    </a:pPr>
+                    <a:endParaRPr kumimoji="0" lang="en-US" sz="1200" b="0" i="0" u="none" strike="noStrike" kern="0" cap="none" spc="0" normalizeH="0" baseline="0" noProof="0" smtClean="0">
+                      <a:ln>
+                        <a:noFill/>
+                      </a:ln>
+                      <a:solidFill>
+                        <a:prstClr val="white"/>
+                      </a:solidFill>
+                      <a:effectLst/>
+                      <a:uLnTx/>
+                      <a:uFillTx/>
+                      <a:latin typeface="Calibri"/>
+                    </a:endParaRPr>
+                  </a:p>
+                </p:txBody>
+              </p:sp>
+              <p:sp>
+                <p:nvSpPr>
+                  <p:cNvPr id="136" name="Isosceles Triangle 135"/>
+                  <p:cNvSpPr/>
+                  <p:nvPr/>
+                </p:nvSpPr>
+                <p:spPr>
+                  <a:xfrm>
+                    <a:off x="2511993" y="742881"/>
+                    <a:ext cx="57150" cy="55602"/>
+                  </a:xfrm>
+                  <a:prstGeom prst="triangle">
+                    <a:avLst/>
+                  </a:prstGeom>
+                  <a:solidFill>
+                    <a:sysClr val="window" lastClr="FFFFFF"/>
+                  </a:solidFill>
+                  <a:ln w="12700" cap="flat" cmpd="sng" algn="ctr">
+                    <a:solidFill>
+                      <a:sysClr val="window" lastClr="FFFFFF"/>
+                    </a:solidFill>
+                    <a:prstDash val="solid"/>
+                  </a:ln>
+                  <a:effectLst/>
+                </p:spPr>
+                <p:txBody>
+                  <a:bodyPr rtlCol="0" anchor="ctr"/>
+                  <a:lstStyle/>
+                  <a:p>
+                    <a:pPr marL="0" marR="0" lvl="0" indent="0" algn="ctr" defTabSz="595549" eaLnBrk="1" fontAlgn="auto" latinLnBrk="0" hangingPunct="1">
+                      <a:lnSpc>
+                        <a:spcPct val="100000"/>
+                      </a:lnSpc>
+                      <a:spcBef>
+                        <a:spcPts val="0"/>
+                      </a:spcBef>
+                      <a:spcAft>
+                        <a:spcPts val="0"/>
+                      </a:spcAft>
+                      <a:buClrTx/>
+                      <a:buSzTx/>
+                      <a:buFontTx/>
+                      <a:buNone/>
+                      <a:tabLst/>
+                      <a:defRPr/>
+                    </a:pPr>
+                    <a:endParaRPr kumimoji="0" lang="en-US" sz="1200" b="0" i="0" u="none" strike="noStrike" kern="0" cap="none" spc="0" normalizeH="0" baseline="0" noProof="0" smtClean="0">
+                      <a:ln>
+                        <a:noFill/>
+                      </a:ln>
+                      <a:solidFill>
+                        <a:prstClr val="white"/>
+                      </a:solidFill>
+                      <a:effectLst/>
+                      <a:uLnTx/>
+                      <a:uFillTx/>
+                      <a:latin typeface="Calibri"/>
+                    </a:endParaRPr>
+                  </a:p>
+                </p:txBody>
+              </p:sp>
+            </p:grpSp>
+          </p:grpSp>
+        </p:grpSp>
+        <p:cxnSp>
+          <p:nvCxnSpPr>
+            <p:cNvPr id="122" name="Straight Connector 121"/>
+            <p:cNvCxnSpPr/>
+            <p:nvPr/>
+          </p:nvCxnSpPr>
+          <p:spPr>
+            <a:xfrm flipV="1">
+              <a:off x="3060909" y="1211194"/>
+              <a:ext cx="3886200" cy="1176"/>
+            </a:xfrm>
+            <a:prstGeom prst="line">
+              <a:avLst/>
+            </a:prstGeom>
+            <a:noFill/>
+            <a:ln w="19050" cap="flat" cmpd="sng" algn="ctr">
+              <a:solidFill>
+                <a:srgbClr val="F79646">
+                  <a:lumMod val="75000"/>
+                </a:srgbClr>
+              </a:solidFill>
+              <a:prstDash val="solid"/>
+            </a:ln>
+            <a:effectLst/>
+          </p:spPr>
+        </p:cxnSp>
+      </p:grpSp>
     </p:spTree>
     <p:extLst>
       <p:ext uri="{BB962C8B-B14F-4D97-AF65-F5344CB8AC3E}">
@@ -3592,6 +4912,13 @@
   <p:clrMapOvr>
     <a:masterClrMapping/>
   </p:clrMapOvr>
+  <p:timing>
+    <p:tnLst>
+      <p:par>
+        <p:cTn id="1" dur="indefinite" restart="never" nodeType="tmRoot"/>
+      </p:par>
+    </p:tnLst>
+  </p:timing>
 </p:sld>
 </file>
 
@@ -3689,6 +5016,13 @@
   <p:clrMapOvr>
     <a:masterClrMapping/>
   </p:clrMapOvr>
+  <p:timing>
+    <p:tnLst>
+      <p:par>
+        <p:cTn id="1" dur="indefinite" restart="never" nodeType="tmRoot"/>
+      </p:par>
+    </p:tnLst>
+  </p:timing>
 </p:sld>
 </file>
 
@@ -3808,6 +5142,13 @@
   <p:clrMapOvr>
     <a:masterClrMapping/>
   </p:clrMapOvr>
+  <p:timing>
+    <p:tnLst>
+      <p:par>
+        <p:cTn id="1" dur="indefinite" restart="never" nodeType="tmRoot"/>
+      </p:par>
+    </p:tnLst>
+  </p:timing>
 </p:sld>
 </file>
 
@@ -3928,6 +5269,13 @@
   <p:clrMapOvr>
     <a:masterClrMapping/>
   </p:clrMapOvr>
+  <p:timing>
+    <p:tnLst>
+      <p:par>
+        <p:cTn id="1" dur="indefinite" restart="never" nodeType="tmRoot"/>
+      </p:par>
+    </p:tnLst>
+  </p:timing>
 </p:sld>
 </file>
 
@@ -4047,6 +5395,13 @@
   <p:clrMapOvr>
     <a:masterClrMapping/>
   </p:clrMapOvr>
+  <p:timing>
+    <p:tnLst>
+      <p:par>
+        <p:cTn id="1" dur="indefinite" restart="never" nodeType="tmRoot"/>
+      </p:par>
+    </p:tnLst>
+  </p:timing>
 </p:sld>
 </file>
 
@@ -4119,20 +5474,22 @@
               <a:t>Activities tracked on </a:t>
             </a:r>
             <a:r>
+              <a:rPr lang="en-US" sz="2400" dirty="0" err="1" smtClean="0">
+                <a:hlinkClick r:id="rId2"/>
+              </a:rPr>
+              <a:t>GitHub</a:t>
+            </a:r>
+            <a:endParaRPr lang="en-US" sz="2400" dirty="0" smtClean="0"/>
+          </a:p>
+          <a:p>
+            <a:r>
+              <a:rPr lang="en-US" sz="2400" dirty="0" smtClean="0"/>
+              <a:t>Communication via </a:t>
+            </a:r>
+            <a:r>
               <a:rPr lang="en-US" sz="2400" dirty="0" err="1" smtClean="0"/>
               <a:t>Github</a:t>
             </a:r>
-            <a:endParaRPr lang="en-US" sz="2400" dirty="0" smtClean="0"/>
-          </a:p>
-          <a:p>
-            <a:r>
-              <a:rPr lang="en-US" sz="2400" dirty="0" smtClean="0"/>
-              <a:t>Communication via </a:t>
-            </a:r>
-            <a:r>
-              <a:rPr lang="en-US" sz="2400" dirty="0" err="1" smtClean="0"/>
-              <a:t>Github</a:t>
-            </a:r>
             <a:r>
               <a:rPr lang="en-US" sz="2400" dirty="0" smtClean="0"/>
               <a:t> and </a:t>
@@ -4146,13 +5503,21 @@
           <a:p>
             <a:r>
               <a:rPr lang="en-US" sz="2400" dirty="0" smtClean="0"/>
-              <a:t>Meetings 2-3 hours per day, 4 days/week</a:t>
-            </a:r>
-          </a:p>
-          <a:p>
+              <a:t>Meetings 2-3 hours per day, 4 </a:t>
+            </a:r>
             <a:r>
               <a:rPr lang="en-US" sz="2400" dirty="0" smtClean="0"/>
-              <a:t>Minutes recorded by team leader</a:t>
+              <a:t>days/week</a:t>
+            </a:r>
+          </a:p>
+          <a:p>
+            <a:r>
+              <a:rPr lang="en-US" sz="2400" dirty="0" smtClean="0"/>
+              <a:t>Minutes </a:t>
+            </a:r>
+            <a:r>
+              <a:rPr lang="en-US" sz="2400" dirty="0" smtClean="0"/>
+              <a:t>recorded by team leader</a:t>
             </a:r>
             <a:endParaRPr lang="en-US" sz="2400" dirty="0"/>
           </a:p>
@@ -4168,6 +5533,13 @@
   <p:clrMapOvr>
     <a:masterClrMapping/>
   </p:clrMapOvr>
+  <p:timing>
+    <p:tnLst>
+      <p:par>
+        <p:cTn id="1" dur="indefinite" restart="never" nodeType="tmRoot"/>
+      </p:par>
+    </p:tnLst>
+  </p:timing>
 </p:sld>
 </file>
 
@@ -4259,6 +5631,13 @@
   <p:clrMapOvr>
     <a:masterClrMapping/>
   </p:clrMapOvr>
+  <p:timing>
+    <p:tnLst>
+      <p:par>
+        <p:cTn id="1" dur="indefinite" restart="never" nodeType="tmRoot"/>
+      </p:par>
+    </p:tnLst>
+  </p:timing>
 </p:sld>
 </file>
 
@@ -4352,6 +5731,13 @@
   <p:clrMapOvr>
     <a:masterClrMapping/>
   </p:clrMapOvr>
+  <p:timing>
+    <p:tnLst>
+      <p:par>
+        <p:cTn id="1" dur="indefinite" restart="never" nodeType="tmRoot"/>
+      </p:par>
+    </p:tnLst>
+  </p:timing>
 </p:sld>
 </file>
 

</xml_diff>

<commit_message>
Final Proposal PPTS and PPSX
</commit_message>
<xml_diff>
--- a/docs/Proposal/Proposal Presentation.pptx
+++ b/docs/Proposal/Proposal Presentation.pptx
@@ -1,6 +1,6 @@
 
 <file path=ppt/presentation.xml><?xml version="1.0" encoding="utf-8"?>
-<p:presentation xmlns:a="http://schemas.openxmlformats.org/drawingml/2006/main" xmlns:r="http://schemas.openxmlformats.org/officeDocument/2006/relationships" xmlns:p="http://schemas.openxmlformats.org/presentationml/2006/main" saveSubsetFonts="1">
+<p:presentation xmlns:a="http://schemas.openxmlformats.org/drawingml/2006/main" xmlns:r="http://schemas.openxmlformats.org/officeDocument/2006/relationships" xmlns:p="http://schemas.openxmlformats.org/presentationml/2006/main" embedTrueTypeFonts="1">
   <p:sldMasterIdLst>
     <p:sldMasterId id="2147484788" r:id="rId1"/>
   </p:sldMasterIdLst>
@@ -17,6 +17,26 @@
   </p:sldIdLst>
   <p:sldSz cx="9144000" cy="6858000" type="screen4x3"/>
   <p:notesSz cx="6858000" cy="9144000"/>
+  <p:embeddedFontLst>
+    <p:embeddedFont>
+      <p:font typeface="Postmaster" pitchFamily="2" charset="0"/>
+      <p:regular r:id="rId11"/>
+    </p:embeddedFont>
+    <p:embeddedFont>
+      <p:font typeface="Arial Narrow" panose="020B0606020202030204" pitchFamily="34" charset="0"/>
+      <p:regular r:id="rId12"/>
+      <p:bold r:id="rId13"/>
+      <p:italic r:id="rId14"/>
+      <p:boldItalic r:id="rId15"/>
+    </p:embeddedFont>
+    <p:embeddedFont>
+      <p:font typeface="Calibri" panose="020F0502020204030204" pitchFamily="34" charset="0"/>
+      <p:regular r:id="rId16"/>
+      <p:bold r:id="rId17"/>
+      <p:italic r:id="rId18"/>
+      <p:boldItalic r:id="rId19"/>
+    </p:embeddedFont>
+  </p:embeddedFontLst>
   <p:defaultTextStyle>
     <a:defPPr>
       <a:defRPr lang="en-US"/>
@@ -175,7 +195,7 @@
             <a:fld id="{2233D26B-DFC2-4248-8ED0-AD3E108CBDD7}" type="datetime1">
               <a:rPr lang="en-US" smtClean="0"/>
               <a:pPr/>
-              <a:t>1/21/2014</a:t>
+              <a:t>1/22/2014</a:t>
             </a:fld>
             <a:endParaRPr lang="en-US"/>
           </a:p>
@@ -493,7 +513,7 @@
             <a:fld id="{E694C003-38E8-486A-9BFD-47E55D87241C}" type="datetime1">
               <a:rPr lang="en-US" smtClean="0"/>
               <a:pPr/>
-              <a:t>1/21/2014</a:t>
+              <a:t>1/22/2014</a:t>
             </a:fld>
             <a:endParaRPr lang="en-US"/>
           </a:p>
@@ -670,7 +690,7 @@
             <a:fld id="{E059EAA3-934B-41DB-B3B1-806F4BE5CC37}" type="datetime1">
               <a:rPr lang="en-US" smtClean="0"/>
               <a:pPr/>
-              <a:t>1/21/2014</a:t>
+              <a:t>1/22/2014</a:t>
             </a:fld>
             <a:endParaRPr lang="en-US"/>
           </a:p>
@@ -790,7 +810,7 @@
             <a:fld id="{8F97F932-D99A-4087-BFB1-EA42FAFC8D2C}" type="datetime1">
               <a:rPr lang="en-US" smtClean="0"/>
               <a:pPr/>
-              <a:t>1/21/2014</a:t>
+              <a:t>1/22/2014</a:t>
             </a:fld>
             <a:endParaRPr lang="en-US"/>
           </a:p>
@@ -1090,7 +1110,7 @@
             <a:fld id="{79C96367-2F2B-4F6E-ACF4-15FA13738E10}" type="datetime1">
               <a:rPr lang="en-US" smtClean="0"/>
               <a:pPr/>
-              <a:t>1/21/2014</a:t>
+              <a:t>1/22/2014</a:t>
             </a:fld>
             <a:endParaRPr lang="en-US"/>
           </a:p>
@@ -1385,7 +1405,7 @@
             <a:fld id="{8FB3498D-21C7-408B-8EF5-5B55DEF0BFD5}" type="datetime1">
               <a:rPr lang="en-US" smtClean="0"/>
               <a:pPr/>
-              <a:t>1/21/2014</a:t>
+              <a:t>1/22/2014</a:t>
             </a:fld>
             <a:endParaRPr lang="en-US"/>
           </a:p>
@@ -1815,7 +1835,7 @@
             <a:fld id="{84DB246E-8FD1-42FF-94A4-E4133095C37A}" type="datetime1">
               <a:rPr lang="en-US" smtClean="0"/>
               <a:pPr/>
-              <a:t>1/21/2014</a:t>
+              <a:t>1/22/2014</a:t>
             </a:fld>
             <a:endParaRPr lang="en-US"/>
           </a:p>
@@ -1935,7 +1955,7 @@
             <a:fld id="{A93939D4-B818-4372-B1EE-7CB6D5BBC74A}" type="datetime1">
               <a:rPr lang="en-US" smtClean="0"/>
               <a:pPr/>
-              <a:t>1/21/2014</a:t>
+              <a:t>1/22/2014</a:t>
             </a:fld>
             <a:endParaRPr lang="en-US"/>
           </a:p>
@@ -2027,7 +2047,7 @@
             <a:fld id="{2F35E438-4D0D-4834-B658-A90420491D98}" type="datetime1">
               <a:rPr lang="en-US" smtClean="0"/>
               <a:pPr/>
-              <a:t>1/21/2014</a:t>
+              <a:t>1/22/2014</a:t>
             </a:fld>
             <a:endParaRPr lang="en-US"/>
           </a:p>
@@ -2279,7 +2299,7 @@
             <a:fld id="{76F8ADFA-7142-4015-85E6-1712F15FA709}" type="datetime1">
               <a:rPr lang="en-US" smtClean="0"/>
               <a:pPr/>
-              <a:t>1/21/2014</a:t>
+              <a:t>1/22/2014</a:t>
             </a:fld>
             <a:endParaRPr lang="en-US"/>
           </a:p>
@@ -2797,7 +2817,7 @@
             <a:fld id="{34A581E0-D653-4D78-A48F-41D80498BC7E}" type="datetime1">
               <a:rPr lang="en-US" smtClean="0"/>
               <a:pPr/>
-              <a:t>1/21/2014</a:t>
+              <a:t>1/22/2014</a:t>
             </a:fld>
             <a:endParaRPr lang="en-US"/>
           </a:p>
@@ -3029,7 +3049,7 @@
             <a:fld id="{8B3AFFF1-9C47-49F0-AE12-AF188F3F4E82}" type="datetime1">
               <a:rPr lang="en-US" smtClean="0"/>
               <a:pPr/>
-              <a:t>1/21/2014</a:t>
+              <a:t>1/22/2014</a:t>
             </a:fld>
             <a:endParaRPr lang="en-US" dirty="0"/>
           </a:p>
@@ -5503,21 +5523,13 @@
           <a:p>
             <a:r>
               <a:rPr lang="en-US" sz="2400" dirty="0" smtClean="0"/>
-              <a:t>Meetings 2-3 hours per day, 4 </a:t>
-            </a:r>
+              <a:t>Meetings 2-3 hours per day, 4 days/week</a:t>
+            </a:r>
+          </a:p>
+          <a:p>
             <a:r>
               <a:rPr lang="en-US" sz="2400" dirty="0" smtClean="0"/>
-              <a:t>days/week</a:t>
-            </a:r>
-          </a:p>
-          <a:p>
-            <a:r>
-              <a:rPr lang="en-US" sz="2400" dirty="0" smtClean="0"/>
-              <a:t>Minutes </a:t>
-            </a:r>
-            <a:r>
-              <a:rPr lang="en-US" sz="2400" dirty="0" smtClean="0"/>
-              <a:t>recorded by team leader</a:t>
+              <a:t>Minutes recorded by team leader</a:t>
             </a:r>
             <a:endParaRPr lang="en-US" sz="2400" dirty="0"/>
           </a:p>

</xml_diff>

<commit_message>
Original Arducopter 3.0.1 Firmware
Unaltered flight controller code.
</commit_message>
<xml_diff>
--- a/docs/Proposal/Proposal Presentation.pptx
+++ b/docs/Proposal/Proposal Presentation.pptx
@@ -1,6 +1,6 @@
 
 <file path=ppt/presentation.xml><?xml version="1.0" encoding="utf-8"?>
-<p:presentation xmlns:a="http://schemas.openxmlformats.org/drawingml/2006/main" xmlns:r="http://schemas.openxmlformats.org/officeDocument/2006/relationships" xmlns:p="http://schemas.openxmlformats.org/presentationml/2006/main" saveSubsetFonts="1">
+<p:presentation xmlns:a="http://schemas.openxmlformats.org/drawingml/2006/main" xmlns:r="http://schemas.openxmlformats.org/officeDocument/2006/relationships" xmlns:p="http://schemas.openxmlformats.org/presentationml/2006/main" embedTrueTypeFonts="1">
   <p:sldMasterIdLst>
     <p:sldMasterId id="2147484788" r:id="rId1"/>
   </p:sldMasterIdLst>
@@ -17,6 +17,26 @@
   </p:sldIdLst>
   <p:sldSz cx="9144000" cy="6858000" type="screen4x3"/>
   <p:notesSz cx="6858000" cy="9144000"/>
+  <p:embeddedFontLst>
+    <p:embeddedFont>
+      <p:font typeface="Postmaster" pitchFamily="2" charset="0"/>
+      <p:regular r:id="rId11"/>
+    </p:embeddedFont>
+    <p:embeddedFont>
+      <p:font typeface="Arial Narrow" panose="020B0606020202030204" pitchFamily="34" charset="0"/>
+      <p:regular r:id="rId12"/>
+      <p:bold r:id="rId13"/>
+      <p:italic r:id="rId14"/>
+      <p:boldItalic r:id="rId15"/>
+    </p:embeddedFont>
+    <p:embeddedFont>
+      <p:font typeface="Calibri" panose="020F0502020204030204" pitchFamily="34" charset="0"/>
+      <p:regular r:id="rId16"/>
+      <p:bold r:id="rId17"/>
+      <p:italic r:id="rId18"/>
+      <p:boldItalic r:id="rId19"/>
+    </p:embeddedFont>
+  </p:embeddedFontLst>
   <p:defaultTextStyle>
     <a:defPPr>
       <a:defRPr lang="en-US"/>
@@ -175,7 +195,7 @@
             <a:fld id="{2233D26B-DFC2-4248-8ED0-AD3E108CBDD7}" type="datetime1">
               <a:rPr lang="en-US" smtClean="0"/>
               <a:pPr/>
-              <a:t>1/21/2014</a:t>
+              <a:t>1/22/2014</a:t>
             </a:fld>
             <a:endParaRPr lang="en-US"/>
           </a:p>
@@ -493,7 +513,7 @@
             <a:fld id="{E694C003-38E8-486A-9BFD-47E55D87241C}" type="datetime1">
               <a:rPr lang="en-US" smtClean="0"/>
               <a:pPr/>
-              <a:t>1/21/2014</a:t>
+              <a:t>1/22/2014</a:t>
             </a:fld>
             <a:endParaRPr lang="en-US"/>
           </a:p>
@@ -670,7 +690,7 @@
             <a:fld id="{E059EAA3-934B-41DB-B3B1-806F4BE5CC37}" type="datetime1">
               <a:rPr lang="en-US" smtClean="0"/>
               <a:pPr/>
-              <a:t>1/21/2014</a:t>
+              <a:t>1/22/2014</a:t>
             </a:fld>
             <a:endParaRPr lang="en-US"/>
           </a:p>
@@ -790,7 +810,7 @@
             <a:fld id="{8F97F932-D99A-4087-BFB1-EA42FAFC8D2C}" type="datetime1">
               <a:rPr lang="en-US" smtClean="0"/>
               <a:pPr/>
-              <a:t>1/21/2014</a:t>
+              <a:t>1/22/2014</a:t>
             </a:fld>
             <a:endParaRPr lang="en-US"/>
           </a:p>
@@ -1090,7 +1110,7 @@
             <a:fld id="{79C96367-2F2B-4F6E-ACF4-15FA13738E10}" type="datetime1">
               <a:rPr lang="en-US" smtClean="0"/>
               <a:pPr/>
-              <a:t>1/21/2014</a:t>
+              <a:t>1/22/2014</a:t>
             </a:fld>
             <a:endParaRPr lang="en-US"/>
           </a:p>
@@ -1385,7 +1405,7 @@
             <a:fld id="{8FB3498D-21C7-408B-8EF5-5B55DEF0BFD5}" type="datetime1">
               <a:rPr lang="en-US" smtClean="0"/>
               <a:pPr/>
-              <a:t>1/21/2014</a:t>
+              <a:t>1/22/2014</a:t>
             </a:fld>
             <a:endParaRPr lang="en-US"/>
           </a:p>
@@ -1815,7 +1835,7 @@
             <a:fld id="{84DB246E-8FD1-42FF-94A4-E4133095C37A}" type="datetime1">
               <a:rPr lang="en-US" smtClean="0"/>
               <a:pPr/>
-              <a:t>1/21/2014</a:t>
+              <a:t>1/22/2014</a:t>
             </a:fld>
             <a:endParaRPr lang="en-US"/>
           </a:p>
@@ -1935,7 +1955,7 @@
             <a:fld id="{A93939D4-B818-4372-B1EE-7CB6D5BBC74A}" type="datetime1">
               <a:rPr lang="en-US" smtClean="0"/>
               <a:pPr/>
-              <a:t>1/21/2014</a:t>
+              <a:t>1/22/2014</a:t>
             </a:fld>
             <a:endParaRPr lang="en-US"/>
           </a:p>
@@ -2027,7 +2047,7 @@
             <a:fld id="{2F35E438-4D0D-4834-B658-A90420491D98}" type="datetime1">
               <a:rPr lang="en-US" smtClean="0"/>
               <a:pPr/>
-              <a:t>1/21/2014</a:t>
+              <a:t>1/22/2014</a:t>
             </a:fld>
             <a:endParaRPr lang="en-US"/>
           </a:p>
@@ -2279,7 +2299,7 @@
             <a:fld id="{76F8ADFA-7142-4015-85E6-1712F15FA709}" type="datetime1">
               <a:rPr lang="en-US" smtClean="0"/>
               <a:pPr/>
-              <a:t>1/21/2014</a:t>
+              <a:t>1/22/2014</a:t>
             </a:fld>
             <a:endParaRPr lang="en-US"/>
           </a:p>
@@ -2797,7 +2817,7 @@
             <a:fld id="{34A581E0-D653-4D78-A48F-41D80498BC7E}" type="datetime1">
               <a:rPr lang="en-US" smtClean="0"/>
               <a:pPr/>
-              <a:t>1/21/2014</a:t>
+              <a:t>1/22/2014</a:t>
             </a:fld>
             <a:endParaRPr lang="en-US"/>
           </a:p>
@@ -3029,7 +3049,7 @@
             <a:fld id="{8B3AFFF1-9C47-49F0-AE12-AF188F3F4E82}" type="datetime1">
               <a:rPr lang="en-US" smtClean="0"/>
               <a:pPr/>
-              <a:t>1/21/2014</a:t>
+              <a:t>1/22/2014</a:t>
             </a:fld>
             <a:endParaRPr lang="en-US" dirty="0"/>
           </a:p>
@@ -5503,21 +5523,13 @@
           <a:p>
             <a:r>
               <a:rPr lang="en-US" sz="2400" dirty="0" smtClean="0"/>
-              <a:t>Meetings 2-3 hours per day, 4 </a:t>
-            </a:r>
+              <a:t>Meetings 2-3 hours per day, 4 days/week</a:t>
+            </a:r>
+          </a:p>
+          <a:p>
             <a:r>
               <a:rPr lang="en-US" sz="2400" dirty="0" smtClean="0"/>
-              <a:t>days/week</a:t>
-            </a:r>
-          </a:p>
-          <a:p>
-            <a:r>
-              <a:rPr lang="en-US" sz="2400" dirty="0" smtClean="0"/>
-              <a:t>Minutes </a:t>
-            </a:r>
-            <a:r>
-              <a:rPr lang="en-US" sz="2400" dirty="0" smtClean="0"/>
-              <a:t>recorded by team leader</a:t>
+              <a:t>Minutes recorded by team leader</a:t>
             </a:r>
             <a:endParaRPr lang="en-US" sz="2400" dirty="0"/>
           </a:p>

</xml_diff>